<commit_message>
linearisointi kunnossa (ver 2 toimii)
</commit_message>
<xml_diff>
--- a/Tutkimuskysymysesittely.pptx
+++ b/Tutkimuskysymysesittely.pptx
@@ -242,7 +242,7 @@
               <a:rPr lang="en-CA" smtClean="0">
                 <a:latin typeface="Tilda Sans Medium" panose="020B0502020204020303" pitchFamily="34" charset="0"/>
               </a:rPr>
-              <a:t>2025-06-02</a:t>
+              <a:t>2025-06-06</a:t>
             </a:fld>
             <a:endParaRPr lang="en-CA" dirty="0">
               <a:latin typeface="Tilda Sans Medium" panose="020B0502020204020303" pitchFamily="34" charset="0"/>
@@ -474,7 +474,7 @@
             <a:fld id="{22836CA5-C5A9-496A-AEEC-9D7F83E09475}" type="datetimeFigureOut">
               <a:rPr lang="en-US" smtClean="0"/>
               <a:pPr/>
-              <a:t>6/2/25</a:t>
+              <a:t>6/6/2025</a:t>
             </a:fld>
             <a:endParaRPr lang="en-US" dirty="0"/>
           </a:p>
@@ -12422,8 +12422,8 @@
           </a:p>
         </p:txBody>
       </p:sp>
-      <mc:AlternateContent xmlns:mc="http://schemas.openxmlformats.org/markup-compatibility/2006">
-        <mc:Choice xmlns:a14="http://schemas.microsoft.com/office/drawing/2010/main" Requires="a14">
+      <mc:AlternateContent xmlns:mc="http://schemas.openxmlformats.org/markup-compatibility/2006" xmlns:a14="http://schemas.microsoft.com/office/drawing/2010/main">
+        <mc:Choice Requires="a14">
           <p:sp>
             <p:nvSpPr>
               <p:cNvPr id="5" name="Text Placeholder 4">
@@ -12581,7 +12581,9 @@
                     <m:sSub>
                       <m:sSubPr>
                         <m:ctrlPr>
-                          <a:rPr lang="en-FI" i="1"/>
+                          <a:rPr lang="en-FI" i="1">
+                            <a:latin typeface="Cambria Math" panose="02040503050406030204" pitchFamily="18" charset="0"/>
+                          </a:rPr>
                         </m:ctrlPr>
                       </m:sSubPr>
                       <m:e>
@@ -12589,13 +12591,17 @@
                           <m:rPr>
                             <m:sty m:val="p"/>
                           </m:rPr>
-                          <a:rPr lang="en-FI"/>
+                          <a:rPr lang="en-FI">
+                            <a:latin typeface="Cambria Math" panose="02040503050406030204" pitchFamily="18" charset="0"/>
+                          </a:rPr>
                           <m:t>ω</m:t>
                         </m:r>
                       </m:e>
                       <m:sub>
                         <m:r>
-                          <a:rPr lang="en-FI" i="1"/>
+                          <a:rPr lang="en-FI" i="1">
+                            <a:latin typeface="Cambria Math" panose="02040503050406030204" pitchFamily="18" charset="0"/>
+                          </a:rPr>
                           <m:t>𝑠𝑜𝑜𝑡</m:t>
                         </m:r>
                       </m:sub>
@@ -12647,7 +12653,9 @@
                     <m:sSub>
                       <m:sSubPr>
                         <m:ctrlPr>
-                          <a:rPr lang="en-FI" i="1"/>
+                          <a:rPr lang="en-FI" i="1">
+                            <a:latin typeface="Cambria Math" panose="02040503050406030204" pitchFamily="18" charset="0"/>
+                          </a:rPr>
                         </m:ctrlPr>
                       </m:sSubPr>
                       <m:e>
@@ -12655,13 +12663,17 @@
                           <m:rPr>
                             <m:sty m:val="p"/>
                           </m:rPr>
-                          <a:rPr lang="en-FI"/>
+                          <a:rPr lang="en-FI">
+                            <a:latin typeface="Cambria Math" panose="02040503050406030204" pitchFamily="18" charset="0"/>
+                          </a:rPr>
                           <m:t>ω</m:t>
                         </m:r>
                       </m:e>
                       <m:sub>
                         <m:r>
-                          <a:rPr lang="en-FI" i="1"/>
+                          <a:rPr lang="en-FI" i="1">
+                            <a:latin typeface="Cambria Math" panose="02040503050406030204" pitchFamily="18" charset="0"/>
+                          </a:rPr>
                           <m:t>𝑎𝑠h</m:t>
                         </m:r>
                       </m:sub>
@@ -12908,7 +12920,7 @@
             </p:txBody>
           </p:sp>
         </mc:Choice>
-        <mc:Fallback>
+        <mc:Fallback xmlns="">
           <p:sp>
             <p:nvSpPr>
               <p:cNvPr id="5" name="Text Placeholder 4">
@@ -12952,8 +12964,8 @@
           </p:sp>
         </mc:Fallback>
       </mc:AlternateContent>
-      <mc:AlternateContent xmlns:mc="http://schemas.openxmlformats.org/markup-compatibility/2006">
-        <mc:Choice xmlns:a14="http://schemas.microsoft.com/office/drawing/2010/main" Requires="a14">
+      <mc:AlternateContent xmlns:mc="http://schemas.openxmlformats.org/markup-compatibility/2006" xmlns:a14="http://schemas.microsoft.com/office/drawing/2010/main">
+        <mc:Choice Requires="a14">
           <p:sp>
             <p:nvSpPr>
               <p:cNvPr id="11" name="TextBox 10">
@@ -13165,7 +13177,7 @@
             </p:txBody>
           </p:sp>
         </mc:Choice>
-        <mc:Fallback>
+        <mc:Fallback xmlns="">
           <p:sp>
             <p:nvSpPr>
               <p:cNvPr id="11" name="TextBox 10">
@@ -13210,8 +13222,8 @@
           </p:sp>
         </mc:Fallback>
       </mc:AlternateContent>
-      <mc:AlternateContent xmlns:mc="http://schemas.openxmlformats.org/markup-compatibility/2006">
-        <mc:Choice xmlns:a14="http://schemas.microsoft.com/office/drawing/2010/main" Requires="a14">
+      <mc:AlternateContent xmlns:mc="http://schemas.openxmlformats.org/markup-compatibility/2006" xmlns:a14="http://schemas.microsoft.com/office/drawing/2010/main">
+        <mc:Choice Requires="a14">
           <p:sp>
             <p:nvSpPr>
               <p:cNvPr id="13" name="TextBox 12">
@@ -13438,7 +13450,7 @@
             </p:txBody>
           </p:sp>
         </mc:Choice>
-        <mc:Fallback>
+        <mc:Fallback xmlns="">
           <p:sp>
             <p:nvSpPr>
               <p:cNvPr id="13" name="TextBox 12">
@@ -13483,8 +13495,8 @@
           </p:sp>
         </mc:Fallback>
       </mc:AlternateContent>
-      <mc:AlternateContent xmlns:mc="http://schemas.openxmlformats.org/markup-compatibility/2006">
-        <mc:Choice xmlns:a14="http://schemas.microsoft.com/office/drawing/2010/main" Requires="a14">
+      <mc:AlternateContent xmlns:mc="http://schemas.openxmlformats.org/markup-compatibility/2006" xmlns:a14="http://schemas.microsoft.com/office/drawing/2010/main">
+        <mc:Choice Requires="a14">
           <p:sp>
             <p:nvSpPr>
               <p:cNvPr id="15" name="TextBox 14">
@@ -13875,7 +13887,7 @@
             </p:txBody>
           </p:sp>
         </mc:Choice>
-        <mc:Fallback>
+        <mc:Fallback xmlns="">
           <p:sp>
             <p:nvSpPr>
               <p:cNvPr id="15" name="TextBox 14">
@@ -14940,12 +14952,6 @@
 </file>
 
 <file path=customXml/item1.xml><?xml version="1.0" encoding="utf-8"?>
-<p:properties xmlns:p="http://schemas.microsoft.com/office/2006/metadata/properties" xmlns:xsi="http://www.w3.org/2001/XMLSchema-instance" xmlns:pc="http://schemas.microsoft.com/office/infopath/2007/PartnerControls">
-  <documentManagement/>
-</p:properties>
-</file>
-
-<file path=customXml/item2.xml><?xml version="1.0" encoding="utf-8"?>
 <ct:contentTypeSchema xmlns:ct="http://schemas.microsoft.com/office/2006/metadata/contentType" xmlns:ma="http://schemas.microsoft.com/office/2006/metadata/properties/metaAttributes" ct:_="" ma:_="" ma:contentTypeName="Document" ma:contentTypeID="0x010100208D4596AC30164BAFA497A5A4095D73" ma:contentTypeVersion="4" ma:contentTypeDescription="Create a new document." ma:contentTypeScope="" ma:versionID="ef2e2dc54a61ba576d96e75a97791a46">
   <xsd:schema xmlns:xsd="http://www.w3.org/2001/XMLSchema" xmlns:xs="http://www.w3.org/2001/XMLSchema" xmlns:p="http://schemas.microsoft.com/office/2006/metadata/properties" xmlns:ns2="8d823064-d652-4b4c-a270-db9d06cc321e" targetNamespace="http://schemas.microsoft.com/office/2006/metadata/properties" ma:root="true" ma:fieldsID="1288cfc4f723bed348a111d901062026" ns2:_="">
     <xsd:import namespace="8d823064-d652-4b4c-a270-db9d06cc321e"/>
@@ -15089,6 +15095,12 @@
 </ct:contentTypeSchema>
 </file>
 
+<file path=customXml/item2.xml><?xml version="1.0" encoding="utf-8"?>
+<p:properties xmlns:p="http://schemas.microsoft.com/office/2006/metadata/properties" xmlns:xsi="http://www.w3.org/2001/XMLSchema-instance" xmlns:pc="http://schemas.microsoft.com/office/infopath/2007/PartnerControls">
+  <documentManagement/>
+</p:properties>
+</file>
+
 <file path=customXml/item3.xml><?xml version="1.0" encoding="utf-8"?>
 <?mso-contentType ?>
 <FormTemplates xmlns="http://schemas.microsoft.com/sharepoint/v3/contenttype/forms">
@@ -15099,17 +15111,6 @@
 </file>
 
 <file path=customXml/itemProps1.xml><?xml version="1.0" encoding="utf-8"?>
-<ds:datastoreItem xmlns:ds="http://schemas.openxmlformats.org/officeDocument/2006/customXml" ds:itemID="{21EA1155-8B32-428F-99F0-015FCBDF9232}">
-  <ds:schemaRefs>
-    <ds:schemaRef ds:uri="http://schemas.microsoft.com/office/2006/metadata/properties"/>
-    <ds:schemaRef ds:uri="http://schemas.microsoft.com/office/infopath/2007/PartnerControls"/>
-    <ds:schemaRef ds:uri="41060de2-35f1-4fac-baa6-6544d941150a"/>
-    <ds:schemaRef ds:uri="b96a7a3e-7277-458a-b9ed-2db02f3895ed"/>
-  </ds:schemaRefs>
-</ds:datastoreItem>
-</file>
-
-<file path=customXml/itemProps2.xml><?xml version="1.0" encoding="utf-8"?>
 <ds:datastoreItem xmlns:ds="http://schemas.openxmlformats.org/officeDocument/2006/customXml" ds:itemID="{A85475AC-8F46-432E-A99E-E23EA6B5C44E}">
   <ds:schemaRefs>
     <ds:schemaRef ds:uri="http://schemas.microsoft.com/office/2006/metadata/contentType"/>
@@ -15127,6 +15128,17 @@
 </ds:datastoreItem>
 </file>
 
+<file path=customXml/itemProps2.xml><?xml version="1.0" encoding="utf-8"?>
+<ds:datastoreItem xmlns:ds="http://schemas.openxmlformats.org/officeDocument/2006/customXml" ds:itemID="{21EA1155-8B32-428F-99F0-015FCBDF9232}">
+  <ds:schemaRefs>
+    <ds:schemaRef ds:uri="http://schemas.microsoft.com/office/2006/metadata/properties"/>
+    <ds:schemaRef ds:uri="http://schemas.microsoft.com/office/infopath/2007/PartnerControls"/>
+    <ds:schemaRef ds:uri="41060de2-35f1-4fac-baa6-6544d941150a"/>
+    <ds:schemaRef ds:uri="b96a7a3e-7277-458a-b9ed-2db02f3895ed"/>
+  </ds:schemaRefs>
+</ds:datastoreItem>
+</file>
+
 <file path=customXml/itemProps3.xml><?xml version="1.0" encoding="utf-8"?>
 <ds:datastoreItem xmlns:ds="http://schemas.openxmlformats.org/officeDocument/2006/customXml" ds:itemID="{3FEC0498-E616-4398-8CDE-8BF28A293AEF}">
   <ds:schemaRefs>

</xml_diff>